<commit_message>
Fixed some small stuff
</commit_message>
<xml_diff>
--- a/cicm2015-poster.pptx
+++ b/cicm2015-poster.pptx
@@ -1882,18 +1882,46 @@
         </dgm:presLayoutVars>
       </dgm:prSet>
       <dgm:spPr/>
+      <dgm:t>
+        <a:bodyPr/>
+        <a:lstStyle/>
+        <a:p>
+          <a:endParaRPr lang="en-GB"/>
+        </a:p>
+      </dgm:t>
     </dgm:pt>
     <dgm:pt modelId="{580C5EC2-B321-8348-96A6-69B2D7D9C25A}" type="pres">
       <dgm:prSet presAssocID="{F46A178B-E19F-724F-99EF-E451E2AC192A}" presName="centerShape" presStyleLbl="node0" presStyleIdx="0" presStyleCnt="1"/>
       <dgm:spPr/>
+      <dgm:t>
+        <a:bodyPr/>
+        <a:lstStyle/>
+        <a:p>
+          <a:endParaRPr lang="en-GB"/>
+        </a:p>
+      </dgm:t>
     </dgm:pt>
     <dgm:pt modelId="{7ABBC4B2-E334-5D4A-A8B1-F9B4E7C9213C}" type="pres">
       <dgm:prSet presAssocID="{7CCDD536-CD15-334E-B4D3-4B80927987AE}" presName="parTrans" presStyleLbl="sibTrans2D1" presStyleIdx="0" presStyleCnt="4"/>
       <dgm:spPr/>
+      <dgm:t>
+        <a:bodyPr/>
+        <a:lstStyle/>
+        <a:p>
+          <a:endParaRPr lang="en-GB"/>
+        </a:p>
+      </dgm:t>
     </dgm:pt>
     <dgm:pt modelId="{0BBB25AC-0B10-0840-B720-125AF27BA57D}" type="pres">
       <dgm:prSet presAssocID="{7CCDD536-CD15-334E-B4D3-4B80927987AE}" presName="connectorText" presStyleLbl="sibTrans2D1" presStyleIdx="0" presStyleCnt="4"/>
       <dgm:spPr/>
+      <dgm:t>
+        <a:bodyPr/>
+        <a:lstStyle/>
+        <a:p>
+          <a:endParaRPr lang="en-GB"/>
+        </a:p>
+      </dgm:t>
     </dgm:pt>
     <dgm:pt modelId="{C7ED01B8-1DDB-1F49-A3B7-BDF46B76D552}" type="pres">
       <dgm:prSet presAssocID="{3A90D533-5A64-5147-B455-A1712C6D2C0D}" presName="node" presStyleLbl="node1" presStyleIdx="0" presStyleCnt="4">
@@ -1913,10 +1941,24 @@
     <dgm:pt modelId="{FE4B66CD-C07E-1247-A2F8-E2B1A84C59CA}" type="pres">
       <dgm:prSet presAssocID="{B6A8999E-62F8-F641-8F8C-0437BBA396AF}" presName="parTrans" presStyleLbl="sibTrans2D1" presStyleIdx="1" presStyleCnt="4"/>
       <dgm:spPr/>
+      <dgm:t>
+        <a:bodyPr/>
+        <a:lstStyle/>
+        <a:p>
+          <a:endParaRPr lang="en-GB"/>
+        </a:p>
+      </dgm:t>
     </dgm:pt>
     <dgm:pt modelId="{18522A0C-2FB5-C846-B52D-D5BC273FDCD9}" type="pres">
       <dgm:prSet presAssocID="{B6A8999E-62F8-F641-8F8C-0437BBA396AF}" presName="connectorText" presStyleLbl="sibTrans2D1" presStyleIdx="1" presStyleCnt="4"/>
       <dgm:spPr/>
+      <dgm:t>
+        <a:bodyPr/>
+        <a:lstStyle/>
+        <a:p>
+          <a:endParaRPr lang="en-GB"/>
+        </a:p>
+      </dgm:t>
     </dgm:pt>
     <dgm:pt modelId="{FAFB3D5E-CF76-3044-BF1D-75BDFF452BE4}" type="pres">
       <dgm:prSet presAssocID="{BE8CDE50-AA30-C440-B642-F5BE1BB97B61}" presName="node" presStyleLbl="node1" presStyleIdx="1" presStyleCnt="4">
@@ -1925,14 +1967,35 @@
         </dgm:presLayoutVars>
       </dgm:prSet>
       <dgm:spPr/>
+      <dgm:t>
+        <a:bodyPr/>
+        <a:lstStyle/>
+        <a:p>
+          <a:endParaRPr lang="en-GB"/>
+        </a:p>
+      </dgm:t>
     </dgm:pt>
     <dgm:pt modelId="{AF4C9CB7-0E8A-B04B-8570-C0940F4D65A9}" type="pres">
       <dgm:prSet presAssocID="{3D16CAED-EA4B-394A-9D74-AA86B931A543}" presName="parTrans" presStyleLbl="sibTrans2D1" presStyleIdx="2" presStyleCnt="4"/>
       <dgm:spPr/>
+      <dgm:t>
+        <a:bodyPr/>
+        <a:lstStyle/>
+        <a:p>
+          <a:endParaRPr lang="en-GB"/>
+        </a:p>
+      </dgm:t>
     </dgm:pt>
     <dgm:pt modelId="{3B8331C0-EF4D-9E43-9249-6C60A163EFA4}" type="pres">
       <dgm:prSet presAssocID="{3D16CAED-EA4B-394A-9D74-AA86B931A543}" presName="connectorText" presStyleLbl="sibTrans2D1" presStyleIdx="2" presStyleCnt="4"/>
       <dgm:spPr/>
+      <dgm:t>
+        <a:bodyPr/>
+        <a:lstStyle/>
+        <a:p>
+          <a:endParaRPr lang="en-GB"/>
+        </a:p>
+      </dgm:t>
     </dgm:pt>
     <dgm:pt modelId="{76E86298-7F88-8B44-8992-2543A0365208}" type="pres">
       <dgm:prSet presAssocID="{09B4DD7A-7BF2-E04B-8B51-3A09650E159A}" presName="node" presStyleLbl="node1" presStyleIdx="2" presStyleCnt="4">
@@ -1952,10 +2015,24 @@
     <dgm:pt modelId="{9C670869-D0D4-364D-8B70-023CAC2ECE89}" type="pres">
       <dgm:prSet presAssocID="{4355D6B0-6858-9D41-9195-0FE000E7AB9A}" presName="parTrans" presStyleLbl="sibTrans2D1" presStyleIdx="3" presStyleCnt="4"/>
       <dgm:spPr/>
+      <dgm:t>
+        <a:bodyPr/>
+        <a:lstStyle/>
+        <a:p>
+          <a:endParaRPr lang="en-GB"/>
+        </a:p>
+      </dgm:t>
     </dgm:pt>
     <dgm:pt modelId="{13D8A98B-B9A6-2848-B6A1-F8F3A8213E59}" type="pres">
       <dgm:prSet presAssocID="{4355D6B0-6858-9D41-9195-0FE000E7AB9A}" presName="connectorText" presStyleLbl="sibTrans2D1" presStyleIdx="3" presStyleCnt="4"/>
       <dgm:spPr/>
+      <dgm:t>
+        <a:bodyPr/>
+        <a:lstStyle/>
+        <a:p>
+          <a:endParaRPr lang="en-GB"/>
+        </a:p>
+      </dgm:t>
     </dgm:pt>
     <dgm:pt modelId="{DF9D8650-9AA8-FC4B-8E10-265DB3B343F0}" type="pres">
       <dgm:prSet presAssocID="{6C105103-6249-244B-9274-06EF3A7FCED2}" presName="node" presStyleLbl="node1" presStyleIdx="3" presStyleCnt="4">
@@ -1964,29 +2041,36 @@
         </dgm:presLayoutVars>
       </dgm:prSet>
       <dgm:spPr/>
+      <dgm:t>
+        <a:bodyPr/>
+        <a:lstStyle/>
+        <a:p>
+          <a:endParaRPr lang="en-GB"/>
+        </a:p>
+      </dgm:t>
     </dgm:pt>
   </dgm:ptLst>
   <dgm:cxnLst>
+    <dgm:cxn modelId="{91BC8721-62E1-D749-8369-8CF2D3FCAAF0}" type="presOf" srcId="{3A90D533-5A64-5147-B455-A1712C6D2C0D}" destId="{C7ED01B8-1DDB-1F49-A3B7-BDF46B76D552}" srcOrd="0" destOrd="0" presId="urn:microsoft.com/office/officeart/2005/8/layout/radial5"/>
+    <dgm:cxn modelId="{9C76FEA8-3A52-314B-9259-53EEE8B4C06D}" type="presOf" srcId="{4355D6B0-6858-9D41-9195-0FE000E7AB9A}" destId="{13D8A98B-B9A6-2848-B6A1-F8F3A8213E59}" srcOrd="1" destOrd="0" presId="urn:microsoft.com/office/officeart/2005/8/layout/radial5"/>
+    <dgm:cxn modelId="{D1B4D98E-B2B7-1E46-9199-E38167D07D75}" type="presOf" srcId="{B6A8999E-62F8-F641-8F8C-0437BBA396AF}" destId="{FE4B66CD-C07E-1247-A2F8-E2B1A84C59CA}" srcOrd="0" destOrd="0" presId="urn:microsoft.com/office/officeart/2005/8/layout/radial5"/>
+    <dgm:cxn modelId="{662773A3-1F39-5C42-9B47-6C481666C01B}" type="presOf" srcId="{F46A178B-E19F-724F-99EF-E451E2AC192A}" destId="{580C5EC2-B321-8348-96A6-69B2D7D9C25A}" srcOrd="0" destOrd="0" presId="urn:microsoft.com/office/officeart/2005/8/layout/radial5"/>
+    <dgm:cxn modelId="{A73A4867-18B9-3E4A-8087-620F28C35E0D}" type="presOf" srcId="{7CCDD536-CD15-334E-B4D3-4B80927987AE}" destId="{7ABBC4B2-E334-5D4A-A8B1-F9B4E7C9213C}" srcOrd="0" destOrd="0" presId="urn:microsoft.com/office/officeart/2005/8/layout/radial5"/>
+    <dgm:cxn modelId="{63CFBBB8-493E-7B4D-95C2-3DA6CE4534E3}" srcId="{F46A178B-E19F-724F-99EF-E451E2AC192A}" destId="{09B4DD7A-7BF2-E04B-8B51-3A09650E159A}" srcOrd="2" destOrd="0" parTransId="{3D16CAED-EA4B-394A-9D74-AA86B931A543}" sibTransId="{38F50254-0465-8C4C-BB30-CF1EF28A7CCB}"/>
+    <dgm:cxn modelId="{B33A013D-389E-FA46-8E2D-FC8C6E8A41C9}" type="presOf" srcId="{3D16CAED-EA4B-394A-9D74-AA86B931A543}" destId="{AF4C9CB7-0E8A-B04B-8570-C0940F4D65A9}" srcOrd="0" destOrd="0" presId="urn:microsoft.com/office/officeart/2005/8/layout/radial5"/>
+    <dgm:cxn modelId="{CBF32032-E9C0-F94A-A41D-40B5804B13AD}" type="presOf" srcId="{3D16CAED-EA4B-394A-9D74-AA86B931A543}" destId="{3B8331C0-EF4D-9E43-9249-6C60A163EFA4}" srcOrd="1" destOrd="0" presId="urn:microsoft.com/office/officeart/2005/8/layout/radial5"/>
+    <dgm:cxn modelId="{2EA3EE56-FABF-BA46-87B4-649D44431463}" type="presOf" srcId="{B6A8999E-62F8-F641-8F8C-0437BBA396AF}" destId="{18522A0C-2FB5-C846-B52D-D5BC273FDCD9}" srcOrd="1" destOrd="0" presId="urn:microsoft.com/office/officeart/2005/8/layout/radial5"/>
+    <dgm:cxn modelId="{7063D459-322C-9543-9459-67D8462EF8A8}" type="presOf" srcId="{C8C0CBDC-5F1D-3849-B649-0B2A80BFAED5}" destId="{C53D66F3-B88D-9045-87B3-5B19C55E318C}" srcOrd="0" destOrd="0" presId="urn:microsoft.com/office/officeart/2005/8/layout/radial5"/>
+    <dgm:cxn modelId="{59844860-1563-CC43-8F6C-9CCE4E054B5C}" srcId="{C8C0CBDC-5F1D-3849-B649-0B2A80BFAED5}" destId="{57212AE7-8CDC-654C-9AE6-36194BD2727B}" srcOrd="1" destOrd="0" parTransId="{AF4C51BA-641B-F948-9F93-D955424EBF9F}" sibTransId="{F3C5A20D-4C91-E641-B084-217A348B9656}"/>
+    <dgm:cxn modelId="{ED5A6582-AC78-AD4E-8EBD-30F99D89B916}" type="presOf" srcId="{BE8CDE50-AA30-C440-B642-F5BE1BB97B61}" destId="{FAFB3D5E-CF76-3044-BF1D-75BDFF452BE4}" srcOrd="0" destOrd="0" presId="urn:microsoft.com/office/officeart/2005/8/layout/radial5"/>
+    <dgm:cxn modelId="{E6540C31-A0C0-1A4C-BA48-5DB7EAFBA7A3}" srcId="{F46A178B-E19F-724F-99EF-E451E2AC192A}" destId="{6C105103-6249-244B-9274-06EF3A7FCED2}" srcOrd="3" destOrd="0" parTransId="{4355D6B0-6858-9D41-9195-0FE000E7AB9A}" sibTransId="{7C3BF529-B095-1E4C-ABAF-E4BB5B90A89C}"/>
+    <dgm:cxn modelId="{99C33F50-E443-4741-936B-8F6692895481}" type="presOf" srcId="{6C105103-6249-244B-9274-06EF3A7FCED2}" destId="{DF9D8650-9AA8-FC4B-8E10-265DB3B343F0}" srcOrd="0" destOrd="0" presId="urn:microsoft.com/office/officeart/2005/8/layout/radial5"/>
+    <dgm:cxn modelId="{11BC1C1D-35A6-C14E-96F9-284DE41A70E2}" srcId="{F46A178B-E19F-724F-99EF-E451E2AC192A}" destId="{BE8CDE50-AA30-C440-B642-F5BE1BB97B61}" srcOrd="1" destOrd="0" parTransId="{B6A8999E-62F8-F641-8F8C-0437BBA396AF}" sibTransId="{4F18A2D7-C60B-0E46-8A7A-55D394F54A74}"/>
+    <dgm:cxn modelId="{FDC4D18C-95FB-524C-9C83-0FB887BD6828}" srcId="{C8C0CBDC-5F1D-3849-B649-0B2A80BFAED5}" destId="{F46A178B-E19F-724F-99EF-E451E2AC192A}" srcOrd="0" destOrd="0" parTransId="{46BDF1FE-02F1-0644-A708-5D9DFB89A1D4}" sibTransId="{58F784D9-8447-F34F-A74D-0BB13794CC50}"/>
     <dgm:cxn modelId="{8AEDC194-9BE0-414F-81A8-87D168303C64}" srcId="{F46A178B-E19F-724F-99EF-E451E2AC192A}" destId="{3A90D533-5A64-5147-B455-A1712C6D2C0D}" srcOrd="0" destOrd="0" parTransId="{7CCDD536-CD15-334E-B4D3-4B80927987AE}" sibTransId="{7BEED671-7565-DF4C-9A18-50C27EAABBB0}"/>
-    <dgm:cxn modelId="{59844860-1563-CC43-8F6C-9CCE4E054B5C}" srcId="{C8C0CBDC-5F1D-3849-B649-0B2A80BFAED5}" destId="{57212AE7-8CDC-654C-9AE6-36194BD2727B}" srcOrd="1" destOrd="0" parTransId="{AF4C51BA-641B-F948-9F93-D955424EBF9F}" sibTransId="{F3C5A20D-4C91-E641-B084-217A348B9656}"/>
+    <dgm:cxn modelId="{22C4BB1B-B173-C247-ADCC-8CB85FC6CACE}" type="presOf" srcId="{4355D6B0-6858-9D41-9195-0FE000E7AB9A}" destId="{9C670869-D0D4-364D-8B70-023CAC2ECE89}" srcOrd="0" destOrd="0" presId="urn:microsoft.com/office/officeart/2005/8/layout/radial5"/>
     <dgm:cxn modelId="{080733DD-9635-9941-BFA5-77B34239F124}" type="presOf" srcId="{09B4DD7A-7BF2-E04B-8B51-3A09650E159A}" destId="{76E86298-7F88-8B44-8992-2543A0365208}" srcOrd="0" destOrd="0" presId="urn:microsoft.com/office/officeart/2005/8/layout/radial5"/>
-    <dgm:cxn modelId="{662773A3-1F39-5C42-9B47-6C481666C01B}" type="presOf" srcId="{F46A178B-E19F-724F-99EF-E451E2AC192A}" destId="{580C5EC2-B321-8348-96A6-69B2D7D9C25A}" srcOrd="0" destOrd="0" presId="urn:microsoft.com/office/officeart/2005/8/layout/radial5"/>
-    <dgm:cxn modelId="{D1B4D98E-B2B7-1E46-9199-E38167D07D75}" type="presOf" srcId="{B6A8999E-62F8-F641-8F8C-0437BBA396AF}" destId="{FE4B66CD-C07E-1247-A2F8-E2B1A84C59CA}" srcOrd="0" destOrd="0" presId="urn:microsoft.com/office/officeart/2005/8/layout/radial5"/>
-    <dgm:cxn modelId="{11BC1C1D-35A6-C14E-96F9-284DE41A70E2}" srcId="{F46A178B-E19F-724F-99EF-E451E2AC192A}" destId="{BE8CDE50-AA30-C440-B642-F5BE1BB97B61}" srcOrd="1" destOrd="0" parTransId="{B6A8999E-62F8-F641-8F8C-0437BBA396AF}" sibTransId="{4F18A2D7-C60B-0E46-8A7A-55D394F54A74}"/>
-    <dgm:cxn modelId="{A73A4867-18B9-3E4A-8087-620F28C35E0D}" type="presOf" srcId="{7CCDD536-CD15-334E-B4D3-4B80927987AE}" destId="{7ABBC4B2-E334-5D4A-A8B1-F9B4E7C9213C}" srcOrd="0" destOrd="0" presId="urn:microsoft.com/office/officeart/2005/8/layout/radial5"/>
-    <dgm:cxn modelId="{99C33F50-E443-4741-936B-8F6692895481}" type="presOf" srcId="{6C105103-6249-244B-9274-06EF3A7FCED2}" destId="{DF9D8650-9AA8-FC4B-8E10-265DB3B343F0}" srcOrd="0" destOrd="0" presId="urn:microsoft.com/office/officeart/2005/8/layout/radial5"/>
-    <dgm:cxn modelId="{63CFBBB8-493E-7B4D-95C2-3DA6CE4534E3}" srcId="{F46A178B-E19F-724F-99EF-E451E2AC192A}" destId="{09B4DD7A-7BF2-E04B-8B51-3A09650E159A}" srcOrd="2" destOrd="0" parTransId="{3D16CAED-EA4B-394A-9D74-AA86B931A543}" sibTransId="{38F50254-0465-8C4C-BB30-CF1EF28A7CCB}"/>
-    <dgm:cxn modelId="{7063D459-322C-9543-9459-67D8462EF8A8}" type="presOf" srcId="{C8C0CBDC-5F1D-3849-B649-0B2A80BFAED5}" destId="{C53D66F3-B88D-9045-87B3-5B19C55E318C}" srcOrd="0" destOrd="0" presId="urn:microsoft.com/office/officeart/2005/8/layout/radial5"/>
-    <dgm:cxn modelId="{B33A013D-389E-FA46-8E2D-FC8C6E8A41C9}" type="presOf" srcId="{3D16CAED-EA4B-394A-9D74-AA86B931A543}" destId="{AF4C9CB7-0E8A-B04B-8570-C0940F4D65A9}" srcOrd="0" destOrd="0" presId="urn:microsoft.com/office/officeart/2005/8/layout/radial5"/>
-    <dgm:cxn modelId="{91BC8721-62E1-D749-8369-8CF2D3FCAAF0}" type="presOf" srcId="{3A90D533-5A64-5147-B455-A1712C6D2C0D}" destId="{C7ED01B8-1DDB-1F49-A3B7-BDF46B76D552}" srcOrd="0" destOrd="0" presId="urn:microsoft.com/office/officeart/2005/8/layout/radial5"/>
     <dgm:cxn modelId="{3BD97DC4-0F81-3E4E-B1FB-42DD848A6F07}" type="presOf" srcId="{7CCDD536-CD15-334E-B4D3-4B80927987AE}" destId="{0BBB25AC-0B10-0840-B720-125AF27BA57D}" srcOrd="1" destOrd="0" presId="urn:microsoft.com/office/officeart/2005/8/layout/radial5"/>
-    <dgm:cxn modelId="{2EA3EE56-FABF-BA46-87B4-649D44431463}" type="presOf" srcId="{B6A8999E-62F8-F641-8F8C-0437BBA396AF}" destId="{18522A0C-2FB5-C846-B52D-D5BC273FDCD9}" srcOrd="1" destOrd="0" presId="urn:microsoft.com/office/officeart/2005/8/layout/radial5"/>
-    <dgm:cxn modelId="{22C4BB1B-B173-C247-ADCC-8CB85FC6CACE}" type="presOf" srcId="{4355D6B0-6858-9D41-9195-0FE000E7AB9A}" destId="{9C670869-D0D4-364D-8B70-023CAC2ECE89}" srcOrd="0" destOrd="0" presId="urn:microsoft.com/office/officeart/2005/8/layout/radial5"/>
-    <dgm:cxn modelId="{9C76FEA8-3A52-314B-9259-53EEE8B4C06D}" type="presOf" srcId="{4355D6B0-6858-9D41-9195-0FE000E7AB9A}" destId="{13D8A98B-B9A6-2848-B6A1-F8F3A8213E59}" srcOrd="1" destOrd="0" presId="urn:microsoft.com/office/officeart/2005/8/layout/radial5"/>
-    <dgm:cxn modelId="{E6540C31-A0C0-1A4C-BA48-5DB7EAFBA7A3}" srcId="{F46A178B-E19F-724F-99EF-E451E2AC192A}" destId="{6C105103-6249-244B-9274-06EF3A7FCED2}" srcOrd="3" destOrd="0" parTransId="{4355D6B0-6858-9D41-9195-0FE000E7AB9A}" sibTransId="{7C3BF529-B095-1E4C-ABAF-E4BB5B90A89C}"/>
-    <dgm:cxn modelId="{CBF32032-E9C0-F94A-A41D-40B5804B13AD}" type="presOf" srcId="{3D16CAED-EA4B-394A-9D74-AA86B931A543}" destId="{3B8331C0-EF4D-9E43-9249-6C60A163EFA4}" srcOrd="1" destOrd="0" presId="urn:microsoft.com/office/officeart/2005/8/layout/radial5"/>
-    <dgm:cxn modelId="{FDC4D18C-95FB-524C-9C83-0FB887BD6828}" srcId="{C8C0CBDC-5F1D-3849-B649-0B2A80BFAED5}" destId="{F46A178B-E19F-724F-99EF-E451E2AC192A}" srcOrd="0" destOrd="0" parTransId="{46BDF1FE-02F1-0644-A708-5D9DFB89A1D4}" sibTransId="{58F784D9-8447-F34F-A74D-0BB13794CC50}"/>
-    <dgm:cxn modelId="{ED5A6582-AC78-AD4E-8EBD-30F99D89B916}" type="presOf" srcId="{BE8CDE50-AA30-C440-B642-F5BE1BB97B61}" destId="{FAFB3D5E-CF76-3044-BF1D-75BDFF452BE4}" srcOrd="0" destOrd="0" presId="urn:microsoft.com/office/officeart/2005/8/layout/radial5"/>
     <dgm:cxn modelId="{2D6B6E21-E1F8-FF49-8B3E-C5B3BB6A8371}" type="presParOf" srcId="{C53D66F3-B88D-9045-87B3-5B19C55E318C}" destId="{580C5EC2-B321-8348-96A6-69B2D7D9C25A}" srcOrd="0" destOrd="0" presId="urn:microsoft.com/office/officeart/2005/8/layout/radial5"/>
     <dgm:cxn modelId="{78DC60D4-8560-5944-B997-AF1612D90042}" type="presParOf" srcId="{C53D66F3-B88D-9045-87B3-5B19C55E318C}" destId="{7ABBC4B2-E334-5D4A-A8B1-F9B4E7C9213C}" srcOrd="1" destOrd="0" presId="urn:microsoft.com/office/officeart/2005/8/layout/radial5"/>
     <dgm:cxn modelId="{FF5C9135-093D-9B40-B901-F5DB337807A3}" type="presParOf" srcId="{7ABBC4B2-E334-5D4A-A8B1-F9B4E7C9213C}" destId="{0BBB25AC-0B10-0840-B720-125AF27BA57D}" srcOrd="0" destOrd="0" presId="urn:microsoft.com/office/officeart/2005/8/layout/radial5"/>
@@ -2113,7 +2197,9 @@
     </dgm:pt>
     <dgm:pt modelId="{98491BB1-768B-5C4B-BBC3-39A091E47C34}" type="parTrans" cxnId="{7ABF3385-CA6A-EA44-9F79-7E236A299F4B}">
       <dgm:prSet/>
-      <dgm:spPr/>
+      <dgm:spPr>
+        <a:ln w="76200" cmpd="sng"/>
+      </dgm:spPr>
       <dgm:t>
         <a:bodyPr/>
         <a:lstStyle/>
@@ -2172,7 +2258,13 @@
     </dgm:pt>
     <dgm:pt modelId="{96911CD6-94BE-734D-B6F5-9F613B27B356}" type="parTrans" cxnId="{40685C87-4A07-F74E-AE49-671BD13C571F}">
       <dgm:prSet/>
-      <dgm:spPr/>
+      <dgm:spPr>
+        <a:ln w="76200" cmpd="sng">
+          <a:solidFill>
+            <a:schemeClr val="tx1"/>
+          </a:solidFill>
+        </a:ln>
+      </dgm:spPr>
       <dgm:t>
         <a:bodyPr/>
         <a:lstStyle/>
@@ -2233,7 +2325,13 @@
     </dgm:pt>
     <dgm:pt modelId="{3EC18492-01B6-7047-A283-B6F138227FEA}" type="parTrans" cxnId="{140766C6-3E5C-5447-BE34-C84F730ED02E}">
       <dgm:prSet/>
-      <dgm:spPr/>
+      <dgm:spPr>
+        <a:ln w="76200" cmpd="sng">
+          <a:solidFill>
+            <a:schemeClr val="tx1"/>
+          </a:solidFill>
+        </a:ln>
+      </dgm:spPr>
       <dgm:t>
         <a:bodyPr/>
         <a:lstStyle/>
@@ -2282,7 +2380,13 @@
     </dgm:pt>
     <dgm:pt modelId="{794178FC-0D1D-7C49-A0A0-C552ED482260}" type="parTrans" cxnId="{B5F1ADF6-1A18-FA4F-8562-2E185ACFDF82}">
       <dgm:prSet/>
-      <dgm:spPr/>
+      <dgm:spPr>
+        <a:ln w="76200" cmpd="sng">
+          <a:solidFill>
+            <a:schemeClr val="tx1"/>
+          </a:solidFill>
+        </a:ln>
+      </dgm:spPr>
       <dgm:t>
         <a:bodyPr/>
         <a:lstStyle/>
@@ -2312,18 +2416,46 @@
         </dgm:presLayoutVars>
       </dgm:prSet>
       <dgm:spPr/>
+      <dgm:t>
+        <a:bodyPr/>
+        <a:lstStyle/>
+        <a:p>
+          <a:endParaRPr lang="en-GB"/>
+        </a:p>
+      </dgm:t>
     </dgm:pt>
     <dgm:pt modelId="{6DF4C925-8CC6-AA47-A6CA-DE412B686264}" type="pres">
       <dgm:prSet presAssocID="{F14CB638-B74D-ED4C-BD8E-FDD9E09910C7}" presName="centerShape" presStyleLbl="node0" presStyleIdx="0" presStyleCnt="1"/>
       <dgm:spPr/>
+      <dgm:t>
+        <a:bodyPr/>
+        <a:lstStyle/>
+        <a:p>
+          <a:endParaRPr lang="en-GB"/>
+        </a:p>
+      </dgm:t>
     </dgm:pt>
     <dgm:pt modelId="{A22B6FC2-B0DC-3B46-970A-600D67EE71BA}" type="pres">
       <dgm:prSet presAssocID="{3EC18492-01B6-7047-A283-B6F138227FEA}" presName="Name9" presStyleLbl="parChTrans1D2" presStyleIdx="0" presStyleCnt="4"/>
       <dgm:spPr/>
+      <dgm:t>
+        <a:bodyPr/>
+        <a:lstStyle/>
+        <a:p>
+          <a:endParaRPr lang="en-GB"/>
+        </a:p>
+      </dgm:t>
     </dgm:pt>
     <dgm:pt modelId="{3E336E57-605E-2F4E-A66E-F2A81FCAB3ED}" type="pres">
       <dgm:prSet presAssocID="{3EC18492-01B6-7047-A283-B6F138227FEA}" presName="connTx" presStyleLbl="parChTrans1D2" presStyleIdx="0" presStyleCnt="4"/>
       <dgm:spPr/>
+      <dgm:t>
+        <a:bodyPr/>
+        <a:lstStyle/>
+        <a:p>
+          <a:endParaRPr lang="en-GB"/>
+        </a:p>
+      </dgm:t>
     </dgm:pt>
     <dgm:pt modelId="{A03AAEB2-4E4C-4F44-868C-7CF6E7FA7998}" type="pres">
       <dgm:prSet presAssocID="{C7EBA55C-F2E2-E246-9DDC-9E71A33AB76F}" presName="node" presStyleLbl="node1" presStyleIdx="0" presStyleCnt="4" custRadScaleRad="143120" custRadScaleInc="-98494">
@@ -2343,10 +2475,24 @@
     <dgm:pt modelId="{42921DDD-7DC4-2249-B141-428EACE2D266}" type="pres">
       <dgm:prSet presAssocID="{98491BB1-768B-5C4B-BBC3-39A091E47C34}" presName="Name9" presStyleLbl="parChTrans1D2" presStyleIdx="1" presStyleCnt="4"/>
       <dgm:spPr/>
+      <dgm:t>
+        <a:bodyPr/>
+        <a:lstStyle/>
+        <a:p>
+          <a:endParaRPr lang="en-GB"/>
+        </a:p>
+      </dgm:t>
     </dgm:pt>
     <dgm:pt modelId="{5570C892-DB8B-4946-8690-42ED6A283EAF}" type="pres">
       <dgm:prSet presAssocID="{98491BB1-768B-5C4B-BBC3-39A091E47C34}" presName="connTx" presStyleLbl="parChTrans1D2" presStyleIdx="1" presStyleCnt="4"/>
       <dgm:spPr/>
+      <dgm:t>
+        <a:bodyPr/>
+        <a:lstStyle/>
+        <a:p>
+          <a:endParaRPr lang="en-GB"/>
+        </a:p>
+      </dgm:t>
     </dgm:pt>
     <dgm:pt modelId="{2A1B689B-C457-BF48-A151-610190C99530}" type="pres">
       <dgm:prSet presAssocID="{93CA8E9A-841B-DB41-A61D-61546E7D2525}" presName="node" presStyleLbl="node1" presStyleIdx="1" presStyleCnt="4" custRadScaleRad="139724" custRadScaleInc="-102008">
@@ -2366,10 +2512,24 @@
     <dgm:pt modelId="{17839772-0060-FB46-9D5E-11DCC87894C3}" type="pres">
       <dgm:prSet presAssocID="{96911CD6-94BE-734D-B6F5-9F613B27B356}" presName="Name9" presStyleLbl="parChTrans1D2" presStyleIdx="2" presStyleCnt="4"/>
       <dgm:spPr/>
+      <dgm:t>
+        <a:bodyPr/>
+        <a:lstStyle/>
+        <a:p>
+          <a:endParaRPr lang="en-GB"/>
+        </a:p>
+      </dgm:t>
     </dgm:pt>
     <dgm:pt modelId="{2E6D9793-4081-5F49-A5E7-0A0F2FD8DF82}" type="pres">
       <dgm:prSet presAssocID="{96911CD6-94BE-734D-B6F5-9F613B27B356}" presName="connTx" presStyleLbl="parChTrans1D2" presStyleIdx="2" presStyleCnt="4"/>
       <dgm:spPr/>
+      <dgm:t>
+        <a:bodyPr/>
+        <a:lstStyle/>
+        <a:p>
+          <a:endParaRPr lang="en-GB"/>
+        </a:p>
+      </dgm:t>
     </dgm:pt>
     <dgm:pt modelId="{CAA9D483-1CF2-5C46-A9F1-7BE58D3BF38F}" type="pres">
       <dgm:prSet presAssocID="{2219D024-6F23-364F-A001-6906CCC0BC36}" presName="node" presStyleLbl="node1" presStyleIdx="2" presStyleCnt="4" custRadScaleRad="141883" custRadScaleInc="-99053">
@@ -2378,14 +2538,35 @@
         </dgm:presLayoutVars>
       </dgm:prSet>
       <dgm:spPr/>
+      <dgm:t>
+        <a:bodyPr/>
+        <a:lstStyle/>
+        <a:p>
+          <a:endParaRPr lang="en-GB"/>
+        </a:p>
+      </dgm:t>
     </dgm:pt>
     <dgm:pt modelId="{7C61498A-FF74-CC41-96C4-070D8764FF96}" type="pres">
       <dgm:prSet presAssocID="{794178FC-0D1D-7C49-A0A0-C552ED482260}" presName="Name9" presStyleLbl="parChTrans1D2" presStyleIdx="3" presStyleCnt="4"/>
       <dgm:spPr/>
+      <dgm:t>
+        <a:bodyPr/>
+        <a:lstStyle/>
+        <a:p>
+          <a:endParaRPr lang="en-GB"/>
+        </a:p>
+      </dgm:t>
     </dgm:pt>
     <dgm:pt modelId="{65FC26EA-2C48-6A44-83BA-BF3EF459BD05}" type="pres">
       <dgm:prSet presAssocID="{794178FC-0D1D-7C49-A0A0-C552ED482260}" presName="connTx" presStyleLbl="parChTrans1D2" presStyleIdx="3" presStyleCnt="4"/>
       <dgm:spPr/>
+      <dgm:t>
+        <a:bodyPr/>
+        <a:lstStyle/>
+        <a:p>
+          <a:endParaRPr lang="en-GB"/>
+        </a:p>
+      </dgm:t>
     </dgm:pt>
     <dgm:pt modelId="{98BA5590-0B55-184C-B522-93B1AF70C12D}" type="pres">
       <dgm:prSet presAssocID="{56ADF586-CC6A-C143-9F24-73967A171701}" presName="node" presStyleLbl="node1" presStyleIdx="3" presStyleCnt="4" custRadScaleRad="143710" custRadScaleInc="-100972">
@@ -2404,25 +2585,25 @@
     </dgm:pt>
   </dgm:ptLst>
   <dgm:cxnLst>
-    <dgm:cxn modelId="{42E360CF-83B0-164D-A21E-E4A9D232AE26}" type="presOf" srcId="{96911CD6-94BE-734D-B6F5-9F613B27B356}" destId="{2E6D9793-4081-5F49-A5E7-0A0F2FD8DF82}" srcOrd="1" destOrd="0" presId="urn:microsoft.com/office/officeart/2005/8/layout/radial1"/>
-    <dgm:cxn modelId="{1A319B00-0116-8641-902C-5A5F2874A6F3}" type="presOf" srcId="{3EC18492-01B6-7047-A283-B6F138227FEA}" destId="{A22B6FC2-B0DC-3B46-970A-600D67EE71BA}" srcOrd="0" destOrd="0" presId="urn:microsoft.com/office/officeart/2005/8/layout/radial1"/>
     <dgm:cxn modelId="{C06F0FB2-AABC-F44E-B48B-8A2E722A55B7}" type="presOf" srcId="{56ADF586-CC6A-C143-9F24-73967A171701}" destId="{98BA5590-0B55-184C-B522-93B1AF70C12D}" srcOrd="0" destOrd="0" presId="urn:microsoft.com/office/officeart/2005/8/layout/radial1"/>
-    <dgm:cxn modelId="{140766C6-3E5C-5447-BE34-C84F730ED02E}" srcId="{F14CB638-B74D-ED4C-BD8E-FDD9E09910C7}" destId="{C7EBA55C-F2E2-E246-9DDC-9E71A33AB76F}" srcOrd="0" destOrd="0" parTransId="{3EC18492-01B6-7047-A283-B6F138227FEA}" sibTransId="{7530B075-8C2C-4547-B15D-713F1DE1F406}"/>
-    <dgm:cxn modelId="{B1715924-4B10-4D45-9998-EB960CBF47AD}" type="presOf" srcId="{3EC18492-01B6-7047-A283-B6F138227FEA}" destId="{3E336E57-605E-2F4E-A66E-F2A81FCAB3ED}" srcOrd="1" destOrd="0" presId="urn:microsoft.com/office/officeart/2005/8/layout/radial1"/>
-    <dgm:cxn modelId="{2B292DAF-E8DE-8E45-BE01-64B8EB49A5F6}" type="presOf" srcId="{98491BB1-768B-5C4B-BBC3-39A091E47C34}" destId="{42921DDD-7DC4-2249-B141-428EACE2D266}" srcOrd="0" destOrd="0" presId="urn:microsoft.com/office/officeart/2005/8/layout/radial1"/>
-    <dgm:cxn modelId="{45C7A68F-E44C-2347-8906-48D624127ED0}" type="presOf" srcId="{93CA8E9A-841B-DB41-A61D-61546E7D2525}" destId="{2A1B689B-C457-BF48-A151-610190C99530}" srcOrd="0" destOrd="0" presId="urn:microsoft.com/office/officeart/2005/8/layout/radial1"/>
     <dgm:cxn modelId="{A14F2238-D45B-174C-8A1B-823AA3DBBF61}" type="presOf" srcId="{98491BB1-768B-5C4B-BBC3-39A091E47C34}" destId="{5570C892-DB8B-4946-8690-42ED6A283EAF}" srcOrd="1" destOrd="0" presId="urn:microsoft.com/office/officeart/2005/8/layout/radial1"/>
     <dgm:cxn modelId="{2EBB00B9-725D-1544-B9C2-FE510710DFDE}" type="presOf" srcId="{794178FC-0D1D-7C49-A0A0-C552ED482260}" destId="{7C61498A-FF74-CC41-96C4-070D8764FF96}" srcOrd="0" destOrd="0" presId="urn:microsoft.com/office/officeart/2005/8/layout/radial1"/>
-    <dgm:cxn modelId="{40685C87-4A07-F74E-AE49-671BD13C571F}" srcId="{F14CB638-B74D-ED4C-BD8E-FDD9E09910C7}" destId="{2219D024-6F23-364F-A001-6906CCC0BC36}" srcOrd="2" destOrd="0" parTransId="{96911CD6-94BE-734D-B6F5-9F613B27B356}" sibTransId="{ACC8B9DB-0461-1A4F-A97D-48D09041E379}"/>
+    <dgm:cxn modelId="{42E360CF-83B0-164D-A21E-E4A9D232AE26}" type="presOf" srcId="{96911CD6-94BE-734D-B6F5-9F613B27B356}" destId="{2E6D9793-4081-5F49-A5E7-0A0F2FD8DF82}" srcOrd="1" destOrd="0" presId="urn:microsoft.com/office/officeart/2005/8/layout/radial1"/>
+    <dgm:cxn modelId="{F1CA4F7F-1C16-4B4C-AC34-9323B967A434}" type="presOf" srcId="{F14CB638-B74D-ED4C-BD8E-FDD9E09910C7}" destId="{6DF4C925-8CC6-AA47-A6CA-DE412B686264}" srcOrd="0" destOrd="0" presId="urn:microsoft.com/office/officeart/2005/8/layout/radial1"/>
+    <dgm:cxn modelId="{B1715924-4B10-4D45-9998-EB960CBF47AD}" type="presOf" srcId="{3EC18492-01B6-7047-A283-B6F138227FEA}" destId="{3E336E57-605E-2F4E-A66E-F2A81FCAB3ED}" srcOrd="1" destOrd="0" presId="urn:microsoft.com/office/officeart/2005/8/layout/radial1"/>
+    <dgm:cxn modelId="{45C7A68F-E44C-2347-8906-48D624127ED0}" type="presOf" srcId="{93CA8E9A-841B-DB41-A61D-61546E7D2525}" destId="{2A1B689B-C457-BF48-A151-610190C99530}" srcOrd="0" destOrd="0" presId="urn:microsoft.com/office/officeart/2005/8/layout/radial1"/>
     <dgm:cxn modelId="{B5F1ADF6-1A18-FA4F-8562-2E185ACFDF82}" srcId="{F14CB638-B74D-ED4C-BD8E-FDD9E09910C7}" destId="{56ADF586-CC6A-C143-9F24-73967A171701}" srcOrd="3" destOrd="0" parTransId="{794178FC-0D1D-7C49-A0A0-C552ED482260}" sibTransId="{326E4B0A-AA67-E345-AF36-7BCBEE55ED4B}"/>
-    <dgm:cxn modelId="{0264524A-B189-C748-B1F2-6C495C624D70}" type="presOf" srcId="{C7EBA55C-F2E2-E246-9DDC-9E71A33AB76F}" destId="{A03AAEB2-4E4C-4F44-868C-7CF6E7FA7998}" srcOrd="0" destOrd="0" presId="urn:microsoft.com/office/officeart/2005/8/layout/radial1"/>
-    <dgm:cxn modelId="{F1CA4F7F-1C16-4B4C-AC34-9323B967A434}" type="presOf" srcId="{F14CB638-B74D-ED4C-BD8E-FDD9E09910C7}" destId="{6DF4C925-8CC6-AA47-A6CA-DE412B686264}" srcOrd="0" destOrd="0" presId="urn:microsoft.com/office/officeart/2005/8/layout/radial1"/>
+    <dgm:cxn modelId="{73B3CCC8-8FED-554B-B566-2EAFDDF2B34E}" type="presOf" srcId="{054C43B2-017F-B84E-B05C-2D7C92039D6E}" destId="{AF521888-B978-764B-AD76-146F3168DB3C}" srcOrd="0" destOrd="0" presId="urn:microsoft.com/office/officeart/2005/8/layout/radial1"/>
     <dgm:cxn modelId="{F16EE095-BA8D-924B-875C-95A1B050B7E5}" type="presOf" srcId="{794178FC-0D1D-7C49-A0A0-C552ED482260}" destId="{65FC26EA-2C48-6A44-83BA-BF3EF459BD05}" srcOrd="1" destOrd="0" presId="urn:microsoft.com/office/officeart/2005/8/layout/radial1"/>
     <dgm:cxn modelId="{B1E79E0B-AE9E-5E4D-9EAF-EC65632AFA8A}" type="presOf" srcId="{96911CD6-94BE-734D-B6F5-9F613B27B356}" destId="{17839772-0060-FB46-9D5E-11DCC87894C3}" srcOrd="0" destOrd="0" presId="urn:microsoft.com/office/officeart/2005/8/layout/radial1"/>
+    <dgm:cxn modelId="{1A319B00-0116-8641-902C-5A5F2874A6F3}" type="presOf" srcId="{3EC18492-01B6-7047-A283-B6F138227FEA}" destId="{A22B6FC2-B0DC-3B46-970A-600D67EE71BA}" srcOrd="0" destOrd="0" presId="urn:microsoft.com/office/officeart/2005/8/layout/radial1"/>
+    <dgm:cxn modelId="{40685C87-4A07-F74E-AE49-671BD13C571F}" srcId="{F14CB638-B74D-ED4C-BD8E-FDD9E09910C7}" destId="{2219D024-6F23-364F-A001-6906CCC0BC36}" srcOrd="2" destOrd="0" parTransId="{96911CD6-94BE-734D-B6F5-9F613B27B356}" sibTransId="{ACC8B9DB-0461-1A4F-A97D-48D09041E379}"/>
     <dgm:cxn modelId="{5FD1C5DE-4698-2746-85FF-3F8D55FA5431}" type="presOf" srcId="{2219D024-6F23-364F-A001-6906CCC0BC36}" destId="{CAA9D483-1CF2-5C46-A9F1-7BE58D3BF38F}" srcOrd="0" destOrd="0" presId="urn:microsoft.com/office/officeart/2005/8/layout/radial1"/>
-    <dgm:cxn modelId="{73B3CCC8-8FED-554B-B566-2EAFDDF2B34E}" type="presOf" srcId="{054C43B2-017F-B84E-B05C-2D7C92039D6E}" destId="{AF521888-B978-764B-AD76-146F3168DB3C}" srcOrd="0" destOrd="0" presId="urn:microsoft.com/office/officeart/2005/8/layout/radial1"/>
+    <dgm:cxn modelId="{140766C6-3E5C-5447-BE34-C84F730ED02E}" srcId="{F14CB638-B74D-ED4C-BD8E-FDD9E09910C7}" destId="{C7EBA55C-F2E2-E246-9DDC-9E71A33AB76F}" srcOrd="0" destOrd="0" parTransId="{3EC18492-01B6-7047-A283-B6F138227FEA}" sibTransId="{7530B075-8C2C-4547-B15D-713F1DE1F406}"/>
+    <dgm:cxn modelId="{7ABF3385-CA6A-EA44-9F79-7E236A299F4B}" srcId="{F14CB638-B74D-ED4C-BD8E-FDD9E09910C7}" destId="{93CA8E9A-841B-DB41-A61D-61546E7D2525}" srcOrd="1" destOrd="0" parTransId="{98491BB1-768B-5C4B-BBC3-39A091E47C34}" sibTransId="{B20853E0-5EAA-EB4E-A205-2C7D8509563A}"/>
+    <dgm:cxn modelId="{2B292DAF-E8DE-8E45-BE01-64B8EB49A5F6}" type="presOf" srcId="{98491BB1-768B-5C4B-BBC3-39A091E47C34}" destId="{42921DDD-7DC4-2249-B141-428EACE2D266}" srcOrd="0" destOrd="0" presId="urn:microsoft.com/office/officeart/2005/8/layout/radial1"/>
+    <dgm:cxn modelId="{0264524A-B189-C748-B1F2-6C495C624D70}" type="presOf" srcId="{C7EBA55C-F2E2-E246-9DDC-9E71A33AB76F}" destId="{A03AAEB2-4E4C-4F44-868C-7CF6E7FA7998}" srcOrd="0" destOrd="0" presId="urn:microsoft.com/office/officeart/2005/8/layout/radial1"/>
     <dgm:cxn modelId="{A178F5D8-14DD-E246-99FA-7EDA7E9761ED}" srcId="{054C43B2-017F-B84E-B05C-2D7C92039D6E}" destId="{F14CB638-B74D-ED4C-BD8E-FDD9E09910C7}" srcOrd="0" destOrd="0" parTransId="{6843C2C4-45DB-E74F-AD08-8A248B28391C}" sibTransId="{179E6CEA-74DD-A444-B35D-4855B81052CD}"/>
-    <dgm:cxn modelId="{7ABF3385-CA6A-EA44-9F79-7E236A299F4B}" srcId="{F14CB638-B74D-ED4C-BD8E-FDD9E09910C7}" destId="{93CA8E9A-841B-DB41-A61D-61546E7D2525}" srcOrd="1" destOrd="0" parTransId="{98491BB1-768B-5C4B-BBC3-39A091E47C34}" sibTransId="{B20853E0-5EAA-EB4E-A205-2C7D8509563A}"/>
     <dgm:cxn modelId="{62EEB940-28C9-274F-BF43-E85286E7AB7F}" type="presParOf" srcId="{AF521888-B978-764B-AD76-146F3168DB3C}" destId="{6DF4C925-8CC6-AA47-A6CA-DE412B686264}" srcOrd="0" destOrd="0" presId="urn:microsoft.com/office/officeart/2005/8/layout/radial1"/>
     <dgm:cxn modelId="{A28037F0-7EC6-DB41-8F1D-1E74EB54AD02}" type="presParOf" srcId="{AF521888-B978-764B-AD76-146F3168DB3C}" destId="{A22B6FC2-B0DC-3B46-970A-600D67EE71BA}" srcOrd="1" destOrd="0" presId="urn:microsoft.com/office/officeart/2005/8/layout/radial1"/>
     <dgm:cxn modelId="{BE273855-591E-1247-9348-BDAAF977E56D}" type="presParOf" srcId="{A22B6FC2-B0DC-3B46-970A-600D67EE71BA}" destId="{3E336E57-605E-2F4E-A66E-F2A81FCAB3ED}" srcOrd="0" destOrd="0" presId="urn:microsoft.com/office/officeart/2005/8/layout/radial1"/>
@@ -3201,15 +3382,9 @@
           </a:pathLst>
         </a:custGeom>
         <a:noFill/>
-        <a:ln w="9525" cap="flat" cmpd="sng" algn="ctr">
+        <a:ln w="76200" cap="flat" cmpd="sng" algn="ctr">
           <a:solidFill>
-            <a:schemeClr val="accent1">
-              <a:shade val="60000"/>
-              <a:hueOff val="0"/>
-              <a:satOff val="0"/>
-              <a:lumOff val="0"/>
-              <a:alphaOff val="0"/>
-            </a:schemeClr>
+            <a:schemeClr val="tx1"/>
           </a:solidFill>
           <a:prstDash val="solid"/>
         </a:ln>
@@ -3379,15 +3554,12 @@
           </a:pathLst>
         </a:custGeom>
         <a:noFill/>
-        <a:ln w="9525" cap="flat" cmpd="sng" algn="ctr">
+        <a:ln w="76200" cap="flat" cmpd="sng" algn="ctr">
           <a:solidFill>
-            <a:schemeClr val="accent1">
-              <a:shade val="60000"/>
-              <a:hueOff val="0"/>
-              <a:satOff val="0"/>
-              <a:lumOff val="0"/>
-              <a:alphaOff val="0"/>
-            </a:schemeClr>
+            <a:scrgbClr r="0" g="0" b="0">
+              <a:shade val="95000"/>
+              <a:satMod val="105000"/>
+            </a:scrgbClr>
           </a:solidFill>
           <a:prstDash val="solid"/>
         </a:ln>
@@ -3557,15 +3729,9 @@
           </a:pathLst>
         </a:custGeom>
         <a:noFill/>
-        <a:ln w="9525" cap="flat" cmpd="sng" algn="ctr">
+        <a:ln w="76200" cap="flat" cmpd="sng" algn="ctr">
           <a:solidFill>
-            <a:schemeClr val="accent1">
-              <a:shade val="60000"/>
-              <a:hueOff val="0"/>
-              <a:satOff val="0"/>
-              <a:lumOff val="0"/>
-              <a:alphaOff val="0"/>
-            </a:schemeClr>
+            <a:schemeClr val="tx1"/>
           </a:solidFill>
           <a:prstDash val="solid"/>
         </a:ln>
@@ -3735,15 +3901,9 @@
           </a:pathLst>
         </a:custGeom>
         <a:noFill/>
-        <a:ln w="9525" cap="flat" cmpd="sng" algn="ctr">
+        <a:ln w="76200" cap="flat" cmpd="sng" algn="ctr">
           <a:solidFill>
-            <a:schemeClr val="accent1">
-              <a:shade val="60000"/>
-              <a:hueOff val="0"/>
-              <a:satOff val="0"/>
-              <a:lumOff val="0"/>
-              <a:alphaOff val="0"/>
-            </a:schemeClr>
+            <a:schemeClr val="tx1"/>
           </a:solidFill>
           <a:prstDash val="solid"/>
         </a:ln>
@@ -7630,11 +7790,7 @@
             </a:r>
             <a:r>
               <a:rPr lang="en-GB" sz="6600" b="0" i="0" dirty="0" smtClean="0"/>
-              <a:t>nd </a:t>
-            </a:r>
-            <a:r>
-              <a:rPr lang="en-GB" sz="6600" b="0" i="0" dirty="0" smtClean="0"/>
-              <a:t>some of the systems that use </a:t>
+              <a:t>nd some of the systems that use </a:t>
             </a:r>
             <a:r>
               <a:rPr lang="en-GB" sz="6600" b="0" dirty="0" smtClean="0"/>
@@ -7845,11 +8001,7 @@
           <a:p>
             <a:r>
               <a:rPr lang="en-US" dirty="0" smtClean="0"/>
-              <a:t>The </a:t>
-            </a:r>
-            <a:r>
-              <a:rPr lang="en-US" dirty="0" smtClean="0"/>
-              <a:t>TIP-benchmark </a:t>
+              <a:t>The TIP-benchmark </a:t>
             </a:r>
             <a:r>
               <a:rPr lang="en-US" dirty="0"/>
@@ -7940,15 +8092,7 @@
           <a:p>
             <a:r>
               <a:rPr lang="en-US" b="0" dirty="0" smtClean="0"/>
-              <a:t>We </a:t>
-            </a:r>
-            <a:r>
-              <a:rPr lang="en-US" b="0" dirty="0" smtClean="0"/>
-              <a:t>are developing a set of tools to translate to and from TIP into a variety of other </a:t>
-            </a:r>
-            <a:r>
-              <a:rPr lang="en-US" b="0" dirty="0" smtClean="0"/>
-              <a:t>formats: </a:t>
+              <a:t>We are developing a set of tools to translate to and from TIP into a variety of other formats: </a:t>
             </a:r>
           </a:p>
           <a:p>
@@ -8063,7 +8207,7 @@
         </p:nvSpPr>
         <p:spPr>
           <a:xfrm>
-            <a:off x="13298420" y="7342685"/>
+            <a:off x="13298420" y="7270677"/>
             <a:ext cx="10081121" cy="23978664"/>
           </a:xfrm>
           <a:prstGeom prst="rect">
@@ -8218,7 +8362,15 @@
           <a:p>
             <a:r>
               <a:rPr lang="en-GB" b="0" dirty="0" smtClean="0"/>
-              <a:t>Our group at Chalmers are developing several tools that use TIP.</a:t>
+              <a:t>Our group at Chalmers are developing several tools that </a:t>
+            </a:r>
+            <a:r>
+              <a:rPr lang="en-GB" b="0" dirty="0" smtClean="0"/>
+              <a:t>use and support </a:t>
+            </a:r>
+            <a:r>
+              <a:rPr lang="en-GB" b="0" dirty="0" smtClean="0"/>
+              <a:t>TIP.</a:t>
             </a:r>
           </a:p>
           <a:p>
@@ -8232,8 +8384,13 @@
             </a:r>
             <a:r>
               <a:rPr lang="en-GB" b="0" dirty="0" smtClean="0"/>
-              <a:t>: A conjecture discovery system for Haskell programs. </a:t>
+              <a:t>: A conjecture discovery </a:t>
             </a:r>
+            <a:r>
+              <a:rPr lang="en-GB" b="0" dirty="0" smtClean="0"/>
+              <a:t>system. </a:t>
+            </a:r>
+            <a:endParaRPr lang="en-GB" b="0" dirty="0" smtClean="0"/>
           </a:p>
           <a:p>
             <a:pPr marL="571500" indent="-571500">
@@ -8258,8 +8415,9 @@
             </a:r>
             <a:r>
               <a:rPr lang="en-GB" b="0" dirty="0" smtClean="0"/>
-              <a:t> for Haskell.</a:t>
+              <a:t>.</a:t>
             </a:r>
+            <a:endParaRPr lang="en-GB" b="0" dirty="0" smtClean="0"/>
           </a:p>
           <a:p>
             <a:pPr marL="571500" indent="-571500">
@@ -8296,7 +8454,6 @@
               <a:rPr lang="en-GB" b="0" dirty="0" smtClean="0"/>
               <a:t>A counter-example finder using bounded model checking.</a:t>
             </a:r>
-            <a:endParaRPr lang="en-GB" b="0" dirty="0" smtClean="0"/>
           </a:p>
           <a:p>
             <a:pPr marL="571500" indent="-571500">
@@ -8355,6 +8512,12 @@
           </a:p>
           <a:p>
             <a:endParaRPr lang="en-GB" b="0" dirty="0" smtClean="0"/>
+          </a:p>
+          <a:p>
+            <a:endParaRPr lang="en-GB" b="0" dirty="0" smtClean="0"/>
+          </a:p>
+          <a:p>
+            <a:endParaRPr lang="en-GB" b="0" dirty="0"/>
           </a:p>
           <a:p>
             <a:r>
@@ -8531,7 +8694,7 @@
           <p:nvPr>
             <p:extLst>
               <p:ext uri="{D42A27DB-BD31-4B8C-83A1-F6EECF244321}">
-                <p14:modId xmlns:p14="http://schemas.microsoft.com/office/powerpoint/2010/main" val="4280001451"/>
+                <p14:modId xmlns:p14="http://schemas.microsoft.com/office/powerpoint/2010/main" val="2511432899"/>
               </p:ext>
             </p:extLst>
           </p:nvPr>

</xml_diff>